<commit_message>
Adicionando modo de deploy ao arquivo PPTX
</commit_message>
<xml_diff>
--- a/Empty Coffee cups.pptx
+++ b/Empty Coffee cups.pptx
@@ -5,10 +5,10 @@
     <p:sldMasterId id="2147483673" r:id="rId1"/>
   </p:sldMasterIdLst>
   <p:notesMasterIdLst>
-    <p:notesMasterId r:id="rId11"/>
+    <p:notesMasterId r:id="rId12"/>
   </p:notesMasterIdLst>
   <p:handoutMasterIdLst>
-    <p:handoutMasterId r:id="rId12"/>
+    <p:handoutMasterId r:id="rId13"/>
   </p:handoutMasterIdLst>
   <p:sldIdLst>
     <p:sldId id="257" r:id="rId2"/>
@@ -19,7 +19,8 @@
     <p:sldId id="266" r:id="rId7"/>
     <p:sldId id="265" r:id="rId8"/>
     <p:sldId id="269" r:id="rId9"/>
-    <p:sldId id="267" r:id="rId10"/>
+    <p:sldId id="270" r:id="rId10"/>
+    <p:sldId id="267" r:id="rId11"/>
   </p:sldIdLst>
   <p:sldSz cx="12192000" cy="6858000"/>
   <p:notesSz cx="6858000" cy="9144000"/>
@@ -129,6 +130,14 @@
 </p:presentation>
 </file>
 
+<file path=ppt/revisionInfo.xml><?xml version="1.0" encoding="utf-8"?>
+<p1510:revInfo xmlns:a="http://schemas.openxmlformats.org/drawingml/2006/main" xmlns:r="http://schemas.openxmlformats.org/officeDocument/2006/relationships" xmlns:p1510="http://schemas.microsoft.com/office/powerpoint/2015/10/main">
+  <p1510:revLst>
+    <p1510:client id="{2FEE6864-8FE6-E7DB-4FF3-24B847DF4D13}" v="40" dt="2022-03-24T22:08:10.291"/>
+  </p1510:revLst>
+</p1510:revInfo>
+</file>
+
 <file path=ppt/handoutMasters/handoutMaster1.xml><?xml version="1.0" encoding="utf-8"?>
 <p:handoutMaster xmlns:a="http://schemas.openxmlformats.org/drawingml/2006/main" xmlns:r="http://schemas.openxmlformats.org/officeDocument/2006/relationships" xmlns:p="http://schemas.openxmlformats.org/presentationml/2006/main">
   <p:cSld>
@@ -213,7 +222,7 @@
             <a:pPr rtl="0"/>
             <a:fld id="{4A170B22-A4BB-4708-B0CE-A73E8306129B}" type="datetime1">
               <a:rPr lang="pt-BR" smtClean="0"/>
-              <a:t>22/03/2022</a:t>
+              <a:t>24/03/2022</a:t>
             </a:fld>
             <a:endParaRPr lang="en-US" dirty="0"/>
           </a:p>
@@ -281,7 +290,7 @@
             <a:pPr rtl="0"/>
             <a:fld id="{97ACF5E7-ACB0-497B-A8C6-F2E617B4631D}" type="slidenum">
               <a:rPr lang="en-US" smtClean="0"/>
-              <a:t>‹nº›</a:t>
+              <a:t>‹#›</a:t>
             </a:fld>
             <a:endParaRPr lang="en-US"/>
           </a:p>
@@ -383,7 +392,7 @@
             <a:pPr rtl="0"/>
             <a:fld id="{E6245E56-2EE9-450B-A671-BE5C90BAC91C}" type="datetime1">
               <a:rPr lang="pt-BR" smtClean="0"/>
-              <a:t>22/03/2022</a:t>
+              <a:t>24/03/2022</a:t>
             </a:fld>
             <a:endParaRPr lang="en-US"/>
           </a:p>
@@ -546,7 +555,7 @@
             <a:pPr rtl="0"/>
             <a:fld id="{37A705E3-E620-489D-9973-6221209A4B3B}" type="slidenum">
               <a:rPr lang="en-US" smtClean="0"/>
-              <a:t>‹nº›</a:t>
+              <a:t>‹#›</a:t>
             </a:fld>
             <a:endParaRPr lang="en-US"/>
           </a:p>
@@ -1128,7 +1137,7 @@
             <a:pPr rtl="0"/>
             <a:fld id="{2F3AF6F7-5911-45C3-BE0F-7F38FEFE43FA}" type="datetime1">
               <a:rPr lang="pt-BR" smtClean="0"/>
-              <a:t>22/03/2022</a:t>
+              <a:t>24/03/2022</a:t>
             </a:fld>
             <a:endParaRPr lang="en-US" dirty="0"/>
           </a:p>
@@ -1204,7 +1213,7 @@
             <a:pPr rtl="0"/>
             <a:fld id="{34B7E4EF-A1BD-40F4-AB7B-04F084DD991D}" type="slidenum">
               <a:rPr lang="en-US" smtClean="0"/>
-              <a:t>‹nº›</a:t>
+              <a:t>‹#›</a:t>
             </a:fld>
             <a:endParaRPr lang="en-US" dirty="0"/>
           </a:p>
@@ -1340,7 +1349,7 @@
             <a:pPr rtl="0"/>
             <a:fld id="{870C3F0E-1EAD-419A-B8F3-CB7CDE6B1E86}" type="datetime1">
               <a:rPr lang="pt-BR" smtClean="0"/>
-              <a:t>22/03/2022</a:t>
+              <a:t>24/03/2022</a:t>
             </a:fld>
             <a:endParaRPr lang="en-US"/>
           </a:p>
@@ -1384,7 +1393,7 @@
             <a:pPr rtl="0"/>
             <a:fld id="{34B7E4EF-A1BD-40F4-AB7B-04F084DD991D}" type="slidenum">
               <a:rPr lang="en-US" smtClean="0"/>
-              <a:t>‹nº›</a:t>
+              <a:t>‹#›</a:t>
             </a:fld>
             <a:endParaRPr lang="en-US"/>
           </a:p>
@@ -1528,7 +1537,7 @@
             <a:pPr rtl="0"/>
             <a:fld id="{5274CCBA-3812-426F-BA8C-8BC3E97D7FB5}" type="datetime1">
               <a:rPr lang="pt-BR" smtClean="0"/>
-              <a:t>22/03/2022</a:t>
+              <a:t>24/03/2022</a:t>
             </a:fld>
             <a:endParaRPr lang="en-US"/>
           </a:p>
@@ -1572,7 +1581,7 @@
             <a:pPr rtl="0"/>
             <a:fld id="{34B7E4EF-A1BD-40F4-AB7B-04F084DD991D}" type="slidenum">
               <a:rPr lang="en-US" smtClean="0"/>
-              <a:t>‹nº›</a:t>
+              <a:t>‹#›</a:t>
             </a:fld>
             <a:endParaRPr lang="en-US"/>
           </a:p>
@@ -1708,7 +1717,7 @@
             <a:pPr rtl="0"/>
             <a:fld id="{D48C737E-092E-4203-A347-8410086932C6}" type="datetime1">
               <a:rPr lang="pt-BR" smtClean="0"/>
-              <a:t>22/03/2022</a:t>
+              <a:t>24/03/2022</a:t>
             </a:fld>
             <a:endParaRPr lang="en-US"/>
           </a:p>
@@ -1752,7 +1761,7 @@
             <a:pPr rtl="0"/>
             <a:fld id="{34B7E4EF-A1BD-40F4-AB7B-04F084DD991D}" type="slidenum">
               <a:rPr lang="en-US" smtClean="0"/>
-              <a:t>‹nº›</a:t>
+              <a:t>‹#›</a:t>
             </a:fld>
             <a:endParaRPr lang="en-US"/>
           </a:p>
@@ -2311,7 +2320,7 @@
             <a:pPr rtl="0"/>
             <a:fld id="{494319B4-ED34-4D08-91C0-F7E8BD9417E6}" type="datetime1">
               <a:rPr lang="pt-BR" smtClean="0"/>
-              <a:t>22/03/2022</a:t>
+              <a:t>24/03/2022</a:t>
             </a:fld>
             <a:endParaRPr lang="en-US" dirty="0"/>
           </a:p>
@@ -2387,7 +2396,7 @@
             <a:pPr rtl="0"/>
             <a:fld id="{34B7E4EF-A1BD-40F4-AB7B-04F084DD991D}" type="slidenum">
               <a:rPr lang="en-US" smtClean="0"/>
-              <a:t>‹nº›</a:t>
+              <a:t>‹#›</a:t>
             </a:fld>
             <a:endParaRPr lang="en-US" dirty="0"/>
           </a:p>
@@ -2635,7 +2644,7 @@
             <a:pPr rtl="0"/>
             <a:fld id="{EDD1C28D-3F4C-4305-9CD5-9949626E9ED5}" type="datetime1">
               <a:rPr lang="pt-BR" smtClean="0"/>
-              <a:t>22/03/2022</a:t>
+              <a:t>24/03/2022</a:t>
             </a:fld>
             <a:endParaRPr lang="en-US"/>
           </a:p>
@@ -2679,7 +2688,7 @@
             <a:pPr rtl="0"/>
             <a:fld id="{34B7E4EF-A1BD-40F4-AB7B-04F084DD991D}" type="slidenum">
               <a:rPr lang="en-US" smtClean="0"/>
-              <a:t>‹nº›</a:t>
+              <a:t>‹#›</a:t>
             </a:fld>
             <a:endParaRPr lang="en-US"/>
           </a:p>
@@ -3082,7 +3091,7 @@
             <a:pPr rtl="0"/>
             <a:fld id="{D05F8630-DFFC-437C-A718-61BE3F548C4E}" type="datetime1">
               <a:rPr lang="pt-BR" smtClean="0"/>
-              <a:t>22/03/2022</a:t>
+              <a:t>24/03/2022</a:t>
             </a:fld>
             <a:endParaRPr lang="en-US"/>
           </a:p>
@@ -3126,7 +3135,7 @@
             <a:pPr rtl="0"/>
             <a:fld id="{34B7E4EF-A1BD-40F4-AB7B-04F084DD991D}" type="slidenum">
               <a:rPr lang="en-US" smtClean="0"/>
-              <a:t>‹nº›</a:t>
+              <a:t>‹#›</a:t>
             </a:fld>
             <a:endParaRPr lang="en-US"/>
           </a:p>
@@ -3210,7 +3219,7 @@
             <a:pPr rtl="0"/>
             <a:fld id="{3812AD8E-909B-47FE-B3D6-961E1D2E7A49}" type="datetime1">
               <a:rPr lang="pt-BR" smtClean="0"/>
-              <a:t>22/03/2022</a:t>
+              <a:t>24/03/2022</a:t>
             </a:fld>
             <a:endParaRPr lang="en-US"/>
           </a:p>
@@ -3254,7 +3263,7 @@
             <a:pPr rtl="0"/>
             <a:fld id="{34B7E4EF-A1BD-40F4-AB7B-04F084DD991D}" type="slidenum">
               <a:rPr lang="en-US" smtClean="0"/>
-              <a:t>‹nº›</a:t>
+              <a:t>‹#›</a:t>
             </a:fld>
             <a:endParaRPr lang="en-US"/>
           </a:p>
@@ -3308,7 +3317,7 @@
             <a:pPr rtl="0"/>
             <a:fld id="{5D0BF672-AFC3-4C39-AA84-C1113D4307F1}" type="datetime1">
               <a:rPr lang="pt-BR" smtClean="0"/>
-              <a:t>22/03/2022</a:t>
+              <a:t>24/03/2022</a:t>
             </a:fld>
             <a:endParaRPr lang="en-US"/>
           </a:p>
@@ -3352,7 +3361,7 @@
             <a:pPr rtl="0"/>
             <a:fld id="{34B7E4EF-A1BD-40F4-AB7B-04F084DD991D}" type="slidenum">
               <a:rPr lang="en-US" smtClean="0"/>
-              <a:t>‹nº›</a:t>
+              <a:t>‹#›</a:t>
             </a:fld>
             <a:endParaRPr lang="en-US"/>
           </a:p>
@@ -3729,7 +3738,7 @@
             <a:pPr rtl="0"/>
             <a:fld id="{B01F5550-97CC-4F3B-A34B-FE39BFD06EF0}" type="datetime1">
               <a:rPr lang="pt-BR" smtClean="0"/>
-              <a:t>22/03/2022</a:t>
+              <a:t>24/03/2022</a:t>
             </a:fld>
             <a:endParaRPr lang="en-US"/>
           </a:p>
@@ -3798,7 +3807,7 @@
             <a:pPr rtl="0"/>
             <a:fld id="{34B7E4EF-A1BD-40F4-AB7B-04F084DD991D}" type="slidenum">
               <a:rPr lang="en-US" smtClean="0"/>
-              <a:t>‹nº›</a:t>
+              <a:t>‹#›</a:t>
             </a:fld>
             <a:endParaRPr lang="en-US"/>
           </a:p>
@@ -3994,7 +4003,7 @@
             <a:pPr rtl="0"/>
             <a:fld id="{7975B8C2-382E-4F5E-B0CE-7E0EEF75E017}" type="datetime1">
               <a:rPr lang="pt-BR" smtClean="0"/>
-              <a:t>22/03/2022</a:t>
+              <a:t>24/03/2022</a:t>
             </a:fld>
             <a:endParaRPr lang="en-US" dirty="0"/>
           </a:p>
@@ -4066,7 +4075,7 @@
             <a:pPr rtl="0"/>
             <a:fld id="{34B7E4EF-A1BD-40F4-AB7B-04F084DD991D}" type="slidenum">
               <a:rPr lang="en-US" smtClean="0"/>
-              <a:t>‹nº›</a:t>
+              <a:t>‹#›</a:t>
             </a:fld>
             <a:endParaRPr lang="en-US"/>
           </a:p>
@@ -4514,7 +4523,7 @@
             <a:pPr rtl="0"/>
             <a:fld id="{91DF2A3A-30FD-464E-8202-27A276433376}" type="datetime1">
               <a:rPr lang="pt-BR" smtClean="0"/>
-              <a:t>22/03/2022</a:t>
+              <a:t>24/03/2022</a:t>
             </a:fld>
             <a:endParaRPr lang="en-US" dirty="0"/>
           </a:p>
@@ -4596,7 +4605,7 @@
             <a:pPr rtl="0"/>
             <a:fld id="{34B7E4EF-A1BD-40F4-AB7B-04F084DD991D}" type="slidenum">
               <a:rPr lang="en-US" smtClean="0"/>
-              <a:t>‹nº›</a:t>
+              <a:t>‹#›</a:t>
             </a:fld>
             <a:endParaRPr lang="en-US"/>
           </a:p>
@@ -5272,6 +5281,313 @@
 </p:sld>
 </file>
 
+<file path=ppt/slides/slide10.xml><?xml version="1.0" encoding="utf-8"?>
+<p:sld xmlns:a="http://schemas.openxmlformats.org/drawingml/2006/main" xmlns:r="http://schemas.openxmlformats.org/officeDocument/2006/relationships" xmlns:p="http://schemas.openxmlformats.org/presentationml/2006/main">
+  <p:cSld>
+    <p:spTree>
+      <p:nvGrpSpPr>
+        <p:cNvPr id="1" name=""/>
+        <p:cNvGrpSpPr/>
+        <p:nvPr/>
+      </p:nvGrpSpPr>
+      <p:grpSpPr>
+        <a:xfrm>
+          <a:off x="0" y="0"/>
+          <a:ext cx="0" cy="0"/>
+          <a:chOff x="0" y="0"/>
+          <a:chExt cx="0" cy="0"/>
+        </a:xfrm>
+      </p:grpSpPr>
+      <p:sp>
+        <p:nvSpPr>
+          <p:cNvPr id="2" name="Título 1">
+            <a:extLst>
+              <a:ext uri="{FF2B5EF4-FFF2-40B4-BE49-F238E27FC236}">
+                <a16:creationId xmlns:a16="http://schemas.microsoft.com/office/drawing/2014/main" id="{3BD8B75D-54EC-46B8-AC0A-6AFDBC5D768C}"/>
+              </a:ext>
+            </a:extLst>
+          </p:cNvPr>
+          <p:cNvSpPr>
+            <a:spLocks noGrp="1"/>
+          </p:cNvSpPr>
+          <p:nvPr>
+            <p:ph type="title"/>
+          </p:nvPr>
+        </p:nvSpPr>
+        <p:spPr/>
+        <p:txBody>
+          <a:bodyPr/>
+          <a:lstStyle/>
+          <a:p>
+            <a:r>
+              <a:rPr lang="pt-BR" b="1" dirty="0" err="1">
+                <a:solidFill>
+                  <a:schemeClr val="accent2"/>
+                </a:solidFill>
+                <a:latin typeface="Times New Roman" panose="02020603050405020304" pitchFamily="18" charset="0"/>
+                <a:cs typeface="Times New Roman" panose="02020603050405020304" pitchFamily="18" charset="0"/>
+              </a:rPr>
+              <a:t>Empty</a:t>
+            </a:r>
+            <a:r>
+              <a:rPr lang="pt-BR" b="1" dirty="0">
+                <a:solidFill>
+                  <a:schemeClr val="accent2"/>
+                </a:solidFill>
+                <a:latin typeface="Times New Roman" panose="02020603050405020304" pitchFamily="18" charset="0"/>
+                <a:cs typeface="Times New Roman" panose="02020603050405020304" pitchFamily="18" charset="0"/>
+              </a:rPr>
+              <a:t> </a:t>
+            </a:r>
+            <a:r>
+              <a:rPr lang="pt-BR" b="1" dirty="0" err="1">
+                <a:solidFill>
+                  <a:schemeClr val="accent2"/>
+                </a:solidFill>
+                <a:latin typeface="Times New Roman" panose="02020603050405020304" pitchFamily="18" charset="0"/>
+                <a:cs typeface="Times New Roman" panose="02020603050405020304" pitchFamily="18" charset="0"/>
+              </a:rPr>
+              <a:t>Coffee</a:t>
+            </a:r>
+            <a:r>
+              <a:rPr lang="pt-BR" b="1" dirty="0">
+                <a:solidFill>
+                  <a:schemeClr val="accent2"/>
+                </a:solidFill>
+                <a:latin typeface="Times New Roman" panose="02020603050405020304" pitchFamily="18" charset="0"/>
+                <a:cs typeface="Times New Roman" panose="02020603050405020304" pitchFamily="18" charset="0"/>
+              </a:rPr>
+              <a:t> </a:t>
+            </a:r>
+            <a:r>
+              <a:rPr lang="pt-BR" b="1" dirty="0" err="1">
+                <a:solidFill>
+                  <a:schemeClr val="accent2"/>
+                </a:solidFill>
+                <a:latin typeface="Times New Roman" panose="02020603050405020304" pitchFamily="18" charset="0"/>
+                <a:cs typeface="Times New Roman" panose="02020603050405020304" pitchFamily="18" charset="0"/>
+              </a:rPr>
+              <a:t>Cups</a:t>
+            </a:r>
+            <a:r>
+              <a:rPr lang="pt-BR" b="1" dirty="0">
+                <a:solidFill>
+                  <a:schemeClr val="accent2"/>
+                </a:solidFill>
+                <a:latin typeface="Times New Roman" panose="02020603050405020304" pitchFamily="18" charset="0"/>
+                <a:cs typeface="Times New Roman" panose="02020603050405020304" pitchFamily="18" charset="0"/>
+              </a:rPr>
+              <a:t> agradece sua atenção!</a:t>
+            </a:r>
+          </a:p>
+        </p:txBody>
+      </p:sp>
+      <p:sp>
+        <p:nvSpPr>
+          <p:cNvPr id="4" name="Espaço Reservado para Data 3">
+            <a:extLst>
+              <a:ext uri="{FF2B5EF4-FFF2-40B4-BE49-F238E27FC236}">
+                <a16:creationId xmlns:a16="http://schemas.microsoft.com/office/drawing/2014/main" id="{53A3C4CA-2734-4A69-8C03-3FF1E66F325F}"/>
+              </a:ext>
+            </a:extLst>
+          </p:cNvPr>
+          <p:cNvSpPr>
+            <a:spLocks noGrp="1"/>
+          </p:cNvSpPr>
+          <p:nvPr>
+            <p:ph type="dt" sz="half" idx="10"/>
+          </p:nvPr>
+        </p:nvSpPr>
+        <p:spPr/>
+        <p:txBody>
+          <a:bodyPr/>
+          <a:lstStyle/>
+          <a:p>
+            <a:pPr rtl="0"/>
+            <a:fld id="{D48C737E-092E-4203-A347-8410086932C6}" type="datetime1">
+              <a:rPr lang="pt-BR" smtClean="0"/>
+              <a:t>24/03/2022</a:t>
+            </a:fld>
+            <a:endParaRPr lang="en-US"/>
+          </a:p>
+        </p:txBody>
+      </p:sp>
+      <p:sp>
+        <p:nvSpPr>
+          <p:cNvPr id="5" name="Título 1">
+            <a:extLst>
+              <a:ext uri="{FF2B5EF4-FFF2-40B4-BE49-F238E27FC236}">
+                <a16:creationId xmlns:a16="http://schemas.microsoft.com/office/drawing/2014/main" id="{92AAE2BA-F460-494D-AEDD-FE4570FF7D6C}"/>
+              </a:ext>
+            </a:extLst>
+          </p:cNvPr>
+          <p:cNvSpPr txBox="1">
+            <a:spLocks/>
+          </p:cNvSpPr>
+          <p:nvPr/>
+        </p:nvSpPr>
+        <p:spPr>
+          <a:xfrm>
+            <a:off x="8980594" y="4970806"/>
+            <a:ext cx="2144606" cy="1064234"/>
+          </a:xfrm>
+          <a:prstGeom prst="rect">
+            <a:avLst/>
+          </a:prstGeom>
+        </p:spPr>
+        <p:txBody>
+          <a:bodyPr vert="horz" lIns="91440" tIns="45720" rIns="91440" bIns="45720" rtlCol="0" anchor="ctr">
+            <a:normAutofit lnSpcReduction="10000"/>
+          </a:bodyPr>
+          <a:lstStyle>
+            <a:lvl1pPr algn="l" defTabSz="914400" rtl="0" eaLnBrk="1" latinLnBrk="0" hangingPunct="1">
+              <a:lnSpc>
+                <a:spcPct val="90000"/>
+              </a:lnSpc>
+              <a:spcBef>
+                <a:spcPct val="0"/>
+              </a:spcBef>
+              <a:buNone/>
+              <a:defRPr lang="en-US" sz="3800" i="0" kern="1200" cap="none" spc="0" baseline="0">
+                <a:solidFill>
+                  <a:schemeClr val="tx1">
+                    <a:lumMod val="85000"/>
+                    <a:lumOff val="15000"/>
+                  </a:schemeClr>
+                </a:solidFill>
+                <a:effectLst/>
+                <a:latin typeface="+mj-lt"/>
+                <a:ea typeface="+mn-ea"/>
+                <a:cs typeface="+mn-cs"/>
+              </a:defRPr>
+            </a:lvl1pPr>
+          </a:lstStyle>
+          <a:p>
+            <a:r>
+              <a:rPr lang="pt-BR" sz="1800" b="1" dirty="0">
+                <a:solidFill>
+                  <a:schemeClr val="accent2"/>
+                </a:solidFill>
+                <a:latin typeface="Times New Roman" panose="02020603050405020304" pitchFamily="18" charset="0"/>
+                <a:cs typeface="Times New Roman" panose="02020603050405020304" pitchFamily="18" charset="0"/>
+              </a:rPr>
+              <a:t>Erich Pfaffenbach</a:t>
+            </a:r>
+          </a:p>
+          <a:p>
+            <a:r>
+              <a:rPr lang="pt-BR" sz="1800" b="1" dirty="0">
+                <a:solidFill>
+                  <a:schemeClr val="accent2"/>
+                </a:solidFill>
+                <a:latin typeface="Times New Roman" panose="02020603050405020304" pitchFamily="18" charset="0"/>
+                <a:cs typeface="Times New Roman" panose="02020603050405020304" pitchFamily="18" charset="0"/>
+              </a:rPr>
+              <a:t>Iago Luiz</a:t>
+            </a:r>
+          </a:p>
+          <a:p>
+            <a:r>
+              <a:rPr lang="pt-BR" sz="1800" b="1" dirty="0">
+                <a:solidFill>
+                  <a:schemeClr val="accent2"/>
+                </a:solidFill>
+                <a:latin typeface="Times New Roman" panose="02020603050405020304" pitchFamily="18" charset="0"/>
+                <a:cs typeface="Times New Roman" panose="02020603050405020304" pitchFamily="18" charset="0"/>
+              </a:rPr>
+              <a:t>Julia Villela</a:t>
+            </a:r>
+          </a:p>
+          <a:p>
+            <a:r>
+              <a:rPr lang="pt-BR" sz="1800" b="1" dirty="0" err="1">
+                <a:solidFill>
+                  <a:schemeClr val="accent2"/>
+                </a:solidFill>
+                <a:latin typeface="Times New Roman" panose="02020603050405020304" pitchFamily="18" charset="0"/>
+                <a:cs typeface="Times New Roman" panose="02020603050405020304" pitchFamily="18" charset="0"/>
+              </a:rPr>
+              <a:t>Uttoni</a:t>
+            </a:r>
+            <a:r>
+              <a:rPr lang="pt-BR" sz="1800" b="1" dirty="0">
+                <a:solidFill>
+                  <a:schemeClr val="accent2"/>
+                </a:solidFill>
+                <a:latin typeface="Times New Roman" panose="02020603050405020304" pitchFamily="18" charset="0"/>
+                <a:cs typeface="Times New Roman" panose="02020603050405020304" pitchFamily="18" charset="0"/>
+              </a:rPr>
+              <a:t> </a:t>
+            </a:r>
+            <a:r>
+              <a:rPr lang="pt-BR" sz="1800" b="1" dirty="0" err="1">
+                <a:solidFill>
+                  <a:schemeClr val="accent2"/>
+                </a:solidFill>
+                <a:latin typeface="Times New Roman" panose="02020603050405020304" pitchFamily="18" charset="0"/>
+                <a:cs typeface="Times New Roman" panose="02020603050405020304" pitchFamily="18" charset="0"/>
+              </a:rPr>
+              <a:t>Brandani</a:t>
+            </a:r>
+            <a:endParaRPr lang="pt-BR" sz="1800" b="1" dirty="0">
+              <a:solidFill>
+                <a:schemeClr val="accent2"/>
+              </a:solidFill>
+              <a:latin typeface="Times New Roman" panose="02020603050405020304" pitchFamily="18" charset="0"/>
+              <a:cs typeface="Times New Roman" panose="02020603050405020304" pitchFamily="18" charset="0"/>
+            </a:endParaRPr>
+          </a:p>
+        </p:txBody>
+      </p:sp>
+      <p:pic>
+        <p:nvPicPr>
+          <p:cNvPr id="7" name="Imagem 6">
+            <a:extLst>
+              <a:ext uri="{FF2B5EF4-FFF2-40B4-BE49-F238E27FC236}">
+                <a16:creationId xmlns:a16="http://schemas.microsoft.com/office/drawing/2014/main" id="{A4CCC572-BE68-4FF7-A377-C2883654C61C}"/>
+              </a:ext>
+            </a:extLst>
+          </p:cNvPr>
+          <p:cNvPicPr>
+            <a:picLocks noChangeAspect="1"/>
+          </p:cNvPicPr>
+          <p:nvPr/>
+        </p:nvPicPr>
+        <p:blipFill>
+          <a:blip r:embed="rId2">
+            <a:extLst>
+              <a:ext uri="{28A0092B-C50C-407E-A947-70E740481C1C}">
+                <a14:useLocalDpi xmlns:a14="http://schemas.microsoft.com/office/drawing/2010/main" val="0"/>
+              </a:ext>
+            </a:extLst>
+          </a:blip>
+          <a:stretch>
+            <a:fillRect/>
+          </a:stretch>
+        </p:blipFill>
+        <p:spPr>
+          <a:xfrm>
+            <a:off x="3735499" y="2014194"/>
+            <a:ext cx="3926834" cy="3926834"/>
+          </a:xfrm>
+          <a:prstGeom prst="rect">
+            <a:avLst/>
+          </a:prstGeom>
+        </p:spPr>
+      </p:pic>
+    </p:spTree>
+    <p:extLst>
+      <p:ext uri="{BB962C8B-B14F-4D97-AF65-F5344CB8AC3E}">
+        <p14:creationId xmlns:p14="http://schemas.microsoft.com/office/powerpoint/2010/main" val="3078761150"/>
+      </p:ext>
+    </p:extLst>
+  </p:cSld>
+  <p:clrMapOvr>
+    <a:masterClrMapping/>
+  </p:clrMapOvr>
+</p:sld>
+</file>
+
 <file path=ppt/slides/slide2.xml><?xml version="1.0" encoding="utf-8"?>
 <p:sld xmlns:a="http://schemas.openxmlformats.org/drawingml/2006/main" xmlns:r="http://schemas.openxmlformats.org/officeDocument/2006/relationships" xmlns:p="http://schemas.openxmlformats.org/presentationml/2006/main">
   <p:cSld>
@@ -5431,7 +5747,7 @@
             <a:pPr rtl="0"/>
             <a:fld id="{D48C737E-092E-4203-A347-8410086932C6}" type="datetime1">
               <a:rPr lang="pt-BR" smtClean="0"/>
-              <a:t>22/03/2022</a:t>
+              <a:t>24/03/2022</a:t>
             </a:fld>
             <a:endParaRPr lang="en-US"/>
           </a:p>
@@ -5625,7 +5941,7 @@
             <a:pPr rtl="0"/>
             <a:fld id="{D48C737E-092E-4203-A347-8410086932C6}" type="datetime1">
               <a:rPr lang="pt-BR" smtClean="0"/>
-              <a:t>22/03/2022</a:t>
+              <a:t>24/03/2022</a:t>
             </a:fld>
             <a:endParaRPr lang="en-US"/>
           </a:p>
@@ -5841,7 +6157,7 @@
             <a:pPr rtl="0"/>
             <a:fld id="{D48C737E-092E-4203-A347-8410086932C6}" type="datetime1">
               <a:rPr lang="pt-BR" smtClean="0"/>
-              <a:t>22/03/2022</a:t>
+              <a:t>24/03/2022</a:t>
             </a:fld>
             <a:endParaRPr lang="en-US"/>
           </a:p>
@@ -5992,7 +6308,7 @@
             <a:pPr rtl="0"/>
             <a:fld id="{D48C737E-092E-4203-A347-8410086932C6}" type="datetime1">
               <a:rPr lang="pt-BR" smtClean="0"/>
-              <a:t>22/03/2022</a:t>
+              <a:t>24/03/2022</a:t>
             </a:fld>
             <a:endParaRPr lang="en-US"/>
           </a:p>
@@ -6142,7 +6458,7 @@
             <a:pPr rtl="0"/>
             <a:fld id="{D48C737E-092E-4203-A347-8410086932C6}" type="datetime1">
               <a:rPr lang="pt-BR" smtClean="0"/>
-              <a:t>22/03/2022</a:t>
+              <a:t>24/03/2022</a:t>
             </a:fld>
             <a:endParaRPr lang="en-US"/>
           </a:p>
@@ -6331,7 +6647,7 @@
             <a:pPr rtl="0"/>
             <a:fld id="{D48C737E-092E-4203-A347-8410086932C6}" type="datetime1">
               <a:rPr lang="pt-BR" smtClean="0"/>
-              <a:t>22/03/2022</a:t>
+              <a:t>24/03/2022</a:t>
             </a:fld>
             <a:endParaRPr lang="en-US"/>
           </a:p>
@@ -6701,7 +7017,7 @@
             <a:pPr rtl="0"/>
             <a:fld id="{D48C737E-092E-4203-A347-8410086932C6}" type="datetime1">
               <a:rPr lang="pt-BR" smtClean="0"/>
-              <a:t>22/03/2022</a:t>
+              <a:t>24/03/2022</a:t>
             </a:fld>
             <a:endParaRPr lang="en-US"/>
           </a:p>
@@ -6836,7 +7152,7 @@
           <p:cNvPr id="2" name="Título 1">
             <a:extLst>
               <a:ext uri="{FF2B5EF4-FFF2-40B4-BE49-F238E27FC236}">
-                <a16:creationId xmlns:a16="http://schemas.microsoft.com/office/drawing/2014/main" id="{3BD8B75D-54EC-46B8-AC0A-6AFDBC5D768C}"/>
+                <a16:creationId xmlns:a16="http://schemas.microsoft.com/office/drawing/2014/main" id="{536CB6A4-23ED-46CF-BB8C-794C431C527D}"/>
               </a:ext>
             </a:extLst>
           </p:cNvPr>
@@ -6857,61 +7173,95 @@
                 <a:solidFill>
                   <a:schemeClr val="accent2"/>
                 </a:solidFill>
-                <a:latin typeface="Times New Roman" panose="02020603050405020304" pitchFamily="18" charset="0"/>
-                <a:cs typeface="Times New Roman" panose="02020603050405020304" pitchFamily="18" charset="0"/>
+                <a:latin typeface="Times New Roman"/>
+                <a:cs typeface="Times New Roman"/>
               </a:rPr>
-              <a:t>Empty</a:t>
-            </a:r>
-            <a:r>
-              <a:rPr lang="pt-BR" b="1" dirty="0">
-                <a:solidFill>
-                  <a:schemeClr val="accent2"/>
-                </a:solidFill>
-                <a:latin typeface="Times New Roman" panose="02020603050405020304" pitchFamily="18" charset="0"/>
-                <a:cs typeface="Times New Roman" panose="02020603050405020304" pitchFamily="18" charset="0"/>
+              <a:t>Deploy</a:t>
+            </a:r>
+            <a:endParaRPr lang="en-US" dirty="0" err="1">
+              <a:solidFill>
+                <a:schemeClr val="accent2"/>
+              </a:solidFill>
+            </a:endParaRPr>
+          </a:p>
+        </p:txBody>
+      </p:sp>
+      <p:sp>
+        <p:nvSpPr>
+          <p:cNvPr id="3" name="Espaço Reservado para Conteúdo 2">
+            <a:extLst>
+              <a:ext uri="{FF2B5EF4-FFF2-40B4-BE49-F238E27FC236}">
+                <a16:creationId xmlns:a16="http://schemas.microsoft.com/office/drawing/2014/main" id="{ED3FA28B-129E-42D8-8A82-4B348724DF24}"/>
+              </a:ext>
+            </a:extLst>
+          </p:cNvPr>
+          <p:cNvSpPr>
+            <a:spLocks noGrp="1"/>
+          </p:cNvSpPr>
+          <p:nvPr>
+            <p:ph idx="1"/>
+          </p:nvPr>
+        </p:nvSpPr>
+        <p:spPr>
+          <a:xfrm>
+            <a:off x="1066800" y="2103120"/>
+            <a:ext cx="7569200" cy="524369"/>
+          </a:xfrm>
+        </p:spPr>
+        <p:txBody>
+          <a:bodyPr vert="horz" lIns="91440" tIns="45720" rIns="91440" bIns="45720" rtlCol="0" anchor="t">
+            <a:normAutofit/>
+          </a:bodyPr>
+          <a:lstStyle/>
+          <a:p>
+            <a:r>
+              <a:rPr lang="pt-BR" sz="2400" dirty="0">
+                <a:latin typeface="Times New Roman"/>
+                <a:cs typeface="Times New Roman"/>
               </a:rPr>
-              <a:t> </a:t>
-            </a:r>
-            <a:r>
-              <a:rPr lang="pt-BR" b="1" dirty="0" err="1">
-                <a:solidFill>
-                  <a:schemeClr val="accent2"/>
-                </a:solidFill>
-                <a:latin typeface="Times New Roman" panose="02020603050405020304" pitchFamily="18" charset="0"/>
-                <a:cs typeface="Times New Roman" panose="02020603050405020304" pitchFamily="18" charset="0"/>
+              <a:t>Para fazer o </a:t>
+            </a:r>
+            <a:r>
+              <a:rPr lang="pt-BR" sz="2400" dirty="0" err="1">
+                <a:latin typeface="Times New Roman"/>
+                <a:cs typeface="Times New Roman"/>
               </a:rPr>
-              <a:t>Coffee</a:t>
-            </a:r>
-            <a:r>
-              <a:rPr lang="pt-BR" b="1" dirty="0">
-                <a:solidFill>
-                  <a:schemeClr val="accent2"/>
-                </a:solidFill>
-                <a:latin typeface="Times New Roman" panose="02020603050405020304" pitchFamily="18" charset="0"/>
-                <a:cs typeface="Times New Roman" panose="02020603050405020304" pitchFamily="18" charset="0"/>
+              <a:t>deploy</a:t>
+            </a:r>
+            <a:r>
+              <a:rPr lang="pt-BR" sz="2400" dirty="0">
+                <a:latin typeface="Times New Roman"/>
+                <a:cs typeface="Times New Roman"/>
               </a:rPr>
-              <a:t> </a:t>
-            </a:r>
-            <a:r>
-              <a:rPr lang="pt-BR" b="1" dirty="0" err="1">
-                <a:solidFill>
-                  <a:schemeClr val="accent2"/>
-                </a:solidFill>
-                <a:latin typeface="Times New Roman" panose="02020603050405020304" pitchFamily="18" charset="0"/>
-                <a:cs typeface="Times New Roman" panose="02020603050405020304" pitchFamily="18" charset="0"/>
+              <a:t> da aplicação usaremos o </a:t>
+            </a:r>
+            <a:r>
+              <a:rPr lang="pt-BR" sz="2400" dirty="0" err="1">
+                <a:latin typeface="Times New Roman"/>
+                <a:cs typeface="Times New Roman"/>
               </a:rPr>
-              <a:t>Cups</a:t>
-            </a:r>
-            <a:r>
-              <a:rPr lang="pt-BR" b="1" dirty="0">
-                <a:solidFill>
-                  <a:schemeClr val="accent2"/>
-                </a:solidFill>
-                <a:latin typeface="Times New Roman" panose="02020603050405020304" pitchFamily="18" charset="0"/>
-                <a:cs typeface="Times New Roman" panose="02020603050405020304" pitchFamily="18" charset="0"/>
+              <a:t>Heroku</a:t>
+            </a:r>
+            <a:r>
+              <a:rPr lang="pt-BR" sz="2400" dirty="0">
+                <a:latin typeface="Times New Roman"/>
+                <a:cs typeface="Times New Roman"/>
               </a:rPr>
-              <a:t> agradece sua atenção!</a:t>
-            </a:r>
+              <a:t>.</a:t>
+            </a:r>
+            <a:endParaRPr lang="pt-BR" sz="2400" dirty="0">
+              <a:latin typeface="Times New Roman" panose="02020603050405020304" pitchFamily="18" charset="0"/>
+              <a:cs typeface="Times New Roman" panose="02020603050405020304" pitchFamily="18" charset="0"/>
+            </a:endParaRPr>
+          </a:p>
+          <a:p>
+            <a:pPr marL="0" indent="0">
+              <a:buNone/>
+            </a:pPr>
+            <a:endParaRPr lang="pt-BR" sz="2400" dirty="0">
+              <a:latin typeface="Times New Roman" panose="02020603050405020304" pitchFamily="18" charset="0"/>
+              <a:cs typeface="Times New Roman" panose="02020603050405020304" pitchFamily="18" charset="0"/>
+            </a:endParaRPr>
           </a:p>
         </p:txBody>
       </p:sp>
@@ -6920,7 +7270,7 @@
           <p:cNvPr id="4" name="Espaço Reservado para Data 3">
             <a:extLst>
               <a:ext uri="{FF2B5EF4-FFF2-40B4-BE49-F238E27FC236}">
-                <a16:creationId xmlns:a16="http://schemas.microsoft.com/office/drawing/2014/main" id="{53A3C4CA-2734-4A69-8C03-3FF1E66F325F}"/>
+                <a16:creationId xmlns:a16="http://schemas.microsoft.com/office/drawing/2014/main" id="{87712E04-C586-4773-B9AA-63F65AFD37E3}"/>
               </a:ext>
             </a:extLst>
           </p:cNvPr>
@@ -6939,145 +7289,18 @@
             <a:pPr rtl="0"/>
             <a:fld id="{D48C737E-092E-4203-A347-8410086932C6}" type="datetime1">
               <a:rPr lang="pt-BR" smtClean="0"/>
-              <a:t>22/03/2022</a:t>
+              <a:t>24/03/2022</a:t>
             </a:fld>
             <a:endParaRPr lang="en-US"/>
           </a:p>
         </p:txBody>
       </p:sp>
-      <p:sp>
-        <p:nvSpPr>
-          <p:cNvPr id="5" name="Título 1">
+      <p:pic>
+        <p:nvPicPr>
+          <p:cNvPr id="9" name="Picture 9">
             <a:extLst>
               <a:ext uri="{FF2B5EF4-FFF2-40B4-BE49-F238E27FC236}">
-                <a16:creationId xmlns:a16="http://schemas.microsoft.com/office/drawing/2014/main" id="{92AAE2BA-F460-494D-AEDD-FE4570FF7D6C}"/>
-              </a:ext>
-            </a:extLst>
-          </p:cNvPr>
-          <p:cNvSpPr txBox="1">
-            <a:spLocks/>
-          </p:cNvSpPr>
-          <p:nvPr/>
-        </p:nvSpPr>
-        <p:spPr>
-          <a:xfrm>
-            <a:off x="8980594" y="4970806"/>
-            <a:ext cx="2144606" cy="1064234"/>
-          </a:xfrm>
-          <a:prstGeom prst="rect">
-            <a:avLst/>
-          </a:prstGeom>
-        </p:spPr>
-        <p:txBody>
-          <a:bodyPr vert="horz" lIns="91440" tIns="45720" rIns="91440" bIns="45720" rtlCol="0" anchor="ctr">
-            <a:normAutofit lnSpcReduction="10000"/>
-          </a:bodyPr>
-          <a:lstStyle>
-            <a:lvl1pPr algn="l" defTabSz="914400" rtl="0" eaLnBrk="1" latinLnBrk="0" hangingPunct="1">
-              <a:lnSpc>
-                <a:spcPct val="90000"/>
-              </a:lnSpc>
-              <a:spcBef>
-                <a:spcPct val="0"/>
-              </a:spcBef>
-              <a:buNone/>
-              <a:defRPr lang="en-US" sz="3800" i="0" kern="1200" cap="none" spc="0" baseline="0">
-                <a:solidFill>
-                  <a:schemeClr val="tx1">
-                    <a:lumMod val="85000"/>
-                    <a:lumOff val="15000"/>
-                  </a:schemeClr>
-                </a:solidFill>
-                <a:effectLst/>
-                <a:latin typeface="+mj-lt"/>
-                <a:ea typeface="+mn-ea"/>
-                <a:cs typeface="+mn-cs"/>
-              </a:defRPr>
-            </a:lvl1pPr>
-          </a:lstStyle>
-          <a:p>
-            <a:r>
-              <a:rPr lang="pt-BR" sz="1800" b="1" dirty="0">
-                <a:solidFill>
-                  <a:schemeClr val="accent2"/>
-                </a:solidFill>
-                <a:latin typeface="Times New Roman" panose="02020603050405020304" pitchFamily="18" charset="0"/>
-                <a:cs typeface="Times New Roman" panose="02020603050405020304" pitchFamily="18" charset="0"/>
-              </a:rPr>
-              <a:t>Erich Pfaffenbach</a:t>
-            </a:r>
-          </a:p>
-          <a:p>
-            <a:r>
-              <a:rPr lang="pt-BR" sz="1800" b="1" dirty="0">
-                <a:solidFill>
-                  <a:schemeClr val="accent2"/>
-                </a:solidFill>
-                <a:latin typeface="Times New Roman" panose="02020603050405020304" pitchFamily="18" charset="0"/>
-                <a:cs typeface="Times New Roman" panose="02020603050405020304" pitchFamily="18" charset="0"/>
-              </a:rPr>
-              <a:t>Iago Luiz</a:t>
-            </a:r>
-          </a:p>
-          <a:p>
-            <a:r>
-              <a:rPr lang="pt-BR" sz="1800" b="1" dirty="0">
-                <a:solidFill>
-                  <a:schemeClr val="accent2"/>
-                </a:solidFill>
-                <a:latin typeface="Times New Roman" panose="02020603050405020304" pitchFamily="18" charset="0"/>
-                <a:cs typeface="Times New Roman" panose="02020603050405020304" pitchFamily="18" charset="0"/>
-              </a:rPr>
-              <a:t>Julia Villela</a:t>
-            </a:r>
-          </a:p>
-          <a:p>
-            <a:r>
-              <a:rPr lang="pt-BR" sz="1800" b="1" dirty="0" err="1">
-                <a:solidFill>
-                  <a:schemeClr val="accent2"/>
-                </a:solidFill>
-                <a:latin typeface="Times New Roman" panose="02020603050405020304" pitchFamily="18" charset="0"/>
-                <a:cs typeface="Times New Roman" panose="02020603050405020304" pitchFamily="18" charset="0"/>
-              </a:rPr>
-              <a:t>Uttoni</a:t>
-            </a:r>
-            <a:r>
-              <a:rPr lang="pt-BR" sz="1800" b="1" dirty="0">
-                <a:solidFill>
-                  <a:schemeClr val="accent2"/>
-                </a:solidFill>
-                <a:latin typeface="Times New Roman" panose="02020603050405020304" pitchFamily="18" charset="0"/>
-                <a:cs typeface="Times New Roman" panose="02020603050405020304" pitchFamily="18" charset="0"/>
-              </a:rPr>
-              <a:t> </a:t>
-            </a:r>
-            <a:r>
-              <a:rPr lang="pt-BR" sz="1800" b="1" dirty="0" err="1">
-                <a:solidFill>
-                  <a:schemeClr val="accent2"/>
-                </a:solidFill>
-                <a:latin typeface="Times New Roman" panose="02020603050405020304" pitchFamily="18" charset="0"/>
-                <a:cs typeface="Times New Roman" panose="02020603050405020304" pitchFamily="18" charset="0"/>
-              </a:rPr>
-              <a:t>Brandani</a:t>
-            </a:r>
-            <a:endParaRPr lang="pt-BR" sz="1800" b="1" dirty="0">
-              <a:solidFill>
-                <a:schemeClr val="accent2"/>
-              </a:solidFill>
-              <a:latin typeface="Times New Roman" panose="02020603050405020304" pitchFamily="18" charset="0"/>
-              <a:cs typeface="Times New Roman" panose="02020603050405020304" pitchFamily="18" charset="0"/>
-            </a:endParaRPr>
-          </a:p>
-        </p:txBody>
-      </p:sp>
-      <p:pic>
-        <p:nvPicPr>
-          <p:cNvPr id="7" name="Imagem 6">
-            <a:extLst>
-              <a:ext uri="{FF2B5EF4-FFF2-40B4-BE49-F238E27FC236}">
-                <a16:creationId xmlns:a16="http://schemas.microsoft.com/office/drawing/2014/main" id="{A4CCC572-BE68-4FF7-A377-C2883654C61C}"/>
+                <a16:creationId xmlns:a16="http://schemas.microsoft.com/office/drawing/2014/main" id="{DD6DAC76-2F17-779B-AC8E-22A4BC560AE9}"/>
               </a:ext>
             </a:extLst>
           </p:cNvPr>
@@ -7087,21 +7310,15 @@
           <p:nvPr/>
         </p:nvPicPr>
         <p:blipFill>
-          <a:blip r:embed="rId2">
-            <a:extLst>
-              <a:ext uri="{28A0092B-C50C-407E-A947-70E740481C1C}">
-                <a14:useLocalDpi xmlns:a14="http://schemas.microsoft.com/office/drawing/2010/main" val="0"/>
-              </a:ext>
-            </a:extLst>
-          </a:blip>
+          <a:blip r:embed="rId2"/>
           <a:stretch>
             <a:fillRect/>
           </a:stretch>
         </p:blipFill>
         <p:spPr>
           <a:xfrm>
-            <a:off x="3735499" y="2014194"/>
-            <a:ext cx="3926834" cy="3926834"/>
+            <a:off x="4272844" y="3019778"/>
+            <a:ext cx="3660422" cy="2031999"/>
           </a:xfrm>
           <a:prstGeom prst="rect">
             <a:avLst/>
@@ -7111,7 +7328,7 @@
     </p:spTree>
     <p:extLst>
       <p:ext uri="{BB962C8B-B14F-4D97-AF65-F5344CB8AC3E}">
-        <p14:creationId xmlns:p14="http://schemas.microsoft.com/office/powerpoint/2010/main" val="3078761150"/>
+        <p14:creationId xmlns:p14="http://schemas.microsoft.com/office/powerpoint/2010/main" val="1987438472"/>
       </p:ext>
     </p:extLst>
   </p:cSld>

</xml_diff>